<commit_message>
Update slides for mock presentation
</commit_message>
<xml_diff>
--- a/slides.pptx
+++ b/slides.pptx
@@ -8408,7 +8408,15 @@
             </a:r>
             <a:r>
               <a:rPr lang="en-US" dirty="0"/>
-              <a:t>Random Forest &gt; Logistic Regression (once again)</a:t>
+              <a:t>Random Forest </a:t>
+            </a:r>
+            <a:r>
+              <a:rPr lang="en-US"/>
+              <a:t>&gt; Linear </a:t>
+            </a:r>
+            <a:r>
+              <a:rPr lang="en-US" dirty="0"/>
+              <a:t>Regression (once again)</a:t>
             </a:r>
           </a:p>
           <a:p>
@@ -9078,21 +9086,21 @@
             <a:pPr lvl="2"/>
             <a:r>
               <a:rPr lang="en-US" sz="2000" dirty="0"/>
-              <a:t>Sales: Sell as many rooms as possible (who cares about the price, anyways?)</a:t>
+              <a:t>Sales: “Sell as many rooms as possible! (who cares about the price, anyways?)”</a:t>
             </a:r>
           </a:p>
           <a:p>
             <a:pPr lvl="2"/>
             <a:r>
               <a:rPr lang="en-US" sz="2000" dirty="0"/>
-              <a:t>Events: Don’t upset my groups!</a:t>
+              <a:t>Events: “Don’t upset my groups!”</a:t>
             </a:r>
           </a:p>
           <a:p>
             <a:pPr lvl="2"/>
             <a:r>
               <a:rPr lang="en-US" sz="2000" dirty="0"/>
-              <a:t>Front Desk: Don’t get yelled at</a:t>
+              <a:t>Front Desk: “Don’t get me yelled at!”</a:t>
             </a:r>
           </a:p>
           <a:p>

</xml_diff>

<commit_message>
Add slides (nowhere near ready)
</commit_message>
<xml_diff>
--- a/slides.pptx
+++ b/slides.pptx
@@ -8408,15 +8408,7 @@
             </a:r>
             <a:r>
               <a:rPr lang="en-US" dirty="0"/>
-              <a:t>Random Forest </a:t>
-            </a:r>
-            <a:r>
-              <a:rPr lang="en-US"/>
-              <a:t>&gt; Linear </a:t>
-            </a:r>
-            <a:r>
-              <a:rPr lang="en-US" dirty="0"/>
-              <a:t>Regression (once again)</a:t>
+              <a:t>Random Forest &gt; Linear Regression (once again)</a:t>
             </a:r>
           </a:p>
           <a:p>
@@ -8438,8 +8430,13 @@
             <a:pPr lvl="2"/>
             <a:r>
               <a:rPr lang="en-US" dirty="0"/>
-              <a:t>Linear Regression: 0.61</a:t>
-            </a:r>
+              <a:t>Linear Regression</a:t>
+            </a:r>
+            <a:r>
+              <a:rPr lang="en-US"/>
+              <a:t>: 0.71</a:t>
+            </a:r>
+            <a:endParaRPr lang="en-US" dirty="0"/>
           </a:p>
           <a:p>
             <a:pPr lvl="2"/>

</xml_diff>